<commit_message>
adding datga source slide
</commit_message>
<xml_diff>
--- a/PRESENTATION.pptx
+++ b/PRESENTATION.pptx
@@ -8,14 +8,15 @@
     <p:sldId id="256" r:id="rId2"/>
     <p:sldId id="257" r:id="rId3"/>
     <p:sldId id="258" r:id="rId4"/>
-    <p:sldId id="260" r:id="rId5"/>
-    <p:sldId id="259" r:id="rId6"/>
-    <p:sldId id="261" r:id="rId7"/>
-    <p:sldId id="262" r:id="rId8"/>
-    <p:sldId id="263" r:id="rId9"/>
-    <p:sldId id="264" r:id="rId10"/>
-    <p:sldId id="266" r:id="rId11"/>
-    <p:sldId id="265" r:id="rId12"/>
+    <p:sldId id="267" r:id="rId5"/>
+    <p:sldId id="260" r:id="rId6"/>
+    <p:sldId id="259" r:id="rId7"/>
+    <p:sldId id="261" r:id="rId8"/>
+    <p:sldId id="262" r:id="rId9"/>
+    <p:sldId id="263" r:id="rId10"/>
+    <p:sldId id="264" r:id="rId11"/>
+    <p:sldId id="266" r:id="rId12"/>
+    <p:sldId id="265" r:id="rId13"/>
   </p:sldIdLst>
   <p:sldSz cx="12192000" cy="6858000"/>
   <p:notesSz cx="6858000" cy="9144000"/>
@@ -348,7 +349,7 @@
           <a:p>
             <a:fld id="{E9DAE1B8-9CB9-4E25-9D31-628185D72172}" type="datetimeFigureOut">
               <a:rPr lang="en-US" smtClean="0"/>
-              <a:t>12/8/2020</a:t>
+              <a:t>12/9/2020</a:t>
             </a:fld>
             <a:endParaRPr lang="en-US"/>
           </a:p>
@@ -556,7 +557,7 @@
           <a:p>
             <a:fld id="{E9DAE1B8-9CB9-4E25-9D31-628185D72172}" type="datetimeFigureOut">
               <a:rPr lang="en-US" smtClean="0"/>
-              <a:t>12/8/2020</a:t>
+              <a:t>12/9/2020</a:t>
             </a:fld>
             <a:endParaRPr lang="en-US"/>
           </a:p>
@@ -812,7 +813,7 @@
           <a:p>
             <a:fld id="{E9DAE1B8-9CB9-4E25-9D31-628185D72172}" type="datetimeFigureOut">
               <a:rPr lang="en-US" smtClean="0"/>
-              <a:t>12/8/2020</a:t>
+              <a:t>12/9/2020</a:t>
             </a:fld>
             <a:endParaRPr lang="en-US"/>
           </a:p>
@@ -982,7 +983,7 @@
           <a:p>
             <a:fld id="{E9DAE1B8-9CB9-4E25-9D31-628185D72172}" type="datetimeFigureOut">
               <a:rPr lang="en-US" smtClean="0"/>
-              <a:t>12/8/2020</a:t>
+              <a:t>12/9/2020</a:t>
             </a:fld>
             <a:endParaRPr lang="en-US"/>
           </a:p>
@@ -1325,7 +1326,7 @@
           <a:p>
             <a:fld id="{E9DAE1B8-9CB9-4E25-9D31-628185D72172}" type="datetimeFigureOut">
               <a:rPr lang="en-US" smtClean="0"/>
-              <a:t>12/8/2020</a:t>
+              <a:t>12/9/2020</a:t>
             </a:fld>
             <a:endParaRPr lang="en-US"/>
           </a:p>
@@ -1600,7 +1601,7 @@
           <a:p>
             <a:fld id="{E9DAE1B8-9CB9-4E25-9D31-628185D72172}" type="datetimeFigureOut">
               <a:rPr lang="en-US" smtClean="0"/>
-              <a:t>12/8/2020</a:t>
+              <a:t>12/9/2020</a:t>
             </a:fld>
             <a:endParaRPr lang="en-US"/>
           </a:p>
@@ -1979,7 +1980,7 @@
           <a:p>
             <a:fld id="{E9DAE1B8-9CB9-4E25-9D31-628185D72172}" type="datetimeFigureOut">
               <a:rPr lang="en-US" smtClean="0"/>
-              <a:t>12/8/2020</a:t>
+              <a:t>12/9/2020</a:t>
             </a:fld>
             <a:endParaRPr lang="en-US"/>
           </a:p>
@@ -2097,7 +2098,7 @@
           <a:p>
             <a:fld id="{E9DAE1B8-9CB9-4E25-9D31-628185D72172}" type="datetimeFigureOut">
               <a:rPr lang="en-US" smtClean="0"/>
-              <a:t>12/8/2020</a:t>
+              <a:t>12/9/2020</a:t>
             </a:fld>
             <a:endParaRPr lang="en-US"/>
           </a:p>
@@ -2268,7 +2269,7 @@
           <a:p>
             <a:fld id="{E9DAE1B8-9CB9-4E25-9D31-628185D72172}" type="datetimeFigureOut">
               <a:rPr lang="en-US" smtClean="0"/>
-              <a:t>12/8/2020</a:t>
+              <a:t>12/9/2020</a:t>
             </a:fld>
             <a:endParaRPr lang="en-US"/>
           </a:p>
@@ -2622,7 +2623,7 @@
           <a:p>
             <a:fld id="{E9DAE1B8-9CB9-4E25-9D31-628185D72172}" type="datetimeFigureOut">
               <a:rPr lang="en-US" smtClean="0"/>
-              <a:t>12/8/2020</a:t>
+              <a:t>12/9/2020</a:t>
             </a:fld>
             <a:endParaRPr lang="en-US"/>
           </a:p>
@@ -2999,7 +3000,7 @@
           <a:p>
             <a:fld id="{E9DAE1B8-9CB9-4E25-9D31-628185D72172}" type="datetimeFigureOut">
               <a:rPr lang="en-US" smtClean="0"/>
-              <a:t>12/8/2020</a:t>
+              <a:t>12/9/2020</a:t>
             </a:fld>
             <a:endParaRPr lang="en-US"/>
           </a:p>
@@ -3286,7 +3287,7 @@
           <a:p>
             <a:fld id="{E9DAE1B8-9CB9-4E25-9D31-628185D72172}" type="datetimeFigureOut">
               <a:rPr lang="en-US" smtClean="0"/>
-              <a:t>12/8/2020</a:t>
+              <a:t>12/9/2020</a:t>
             </a:fld>
             <a:endParaRPr lang="en-US"/>
           </a:p>
@@ -3937,6 +3938,14 @@
 <file path=ppt/slides/slide10.xml><?xml version="1.0" encoding="utf-8"?>
 <p:sld xmlns:a="http://schemas.openxmlformats.org/drawingml/2006/main" xmlns:r="http://schemas.openxmlformats.org/officeDocument/2006/relationships" xmlns:p="http://schemas.openxmlformats.org/presentationml/2006/main">
   <p:cSld>
+    <p:bg>
+      <p:bgPr>
+        <a:solidFill>
+          <a:schemeClr val="bg1"/>
+        </a:solidFill>
+        <a:effectLst/>
+      </p:bgPr>
+    </p:bg>
     <p:spTree>
       <p:nvGrpSpPr>
         <p:cNvPr id="1" name=""/>
@@ -3953,6 +3962,679 @@
       </p:grpSpPr>
       <p:sp>
         <p:nvSpPr>
+          <p:cNvPr id="11" name="Rectangle 10">
+            <a:extLst>
+              <a:ext uri="{FF2B5EF4-FFF2-40B4-BE49-F238E27FC236}">
+                <a16:creationId xmlns:a16="http://schemas.microsoft.com/office/drawing/2014/main" id="{38CA78E7-359D-40DC-AFAB-8287268FC695}"/>
+              </a:ext>
+              <a:ext uri="{C183D7F6-B498-43B3-948B-1728B52AA6E4}">
+                <adec:decorative xmlns:adec="http://schemas.microsoft.com/office/drawing/2017/decorative" val="1"/>
+              </a:ext>
+            </a:extLst>
+          </p:cNvPr>
+          <p:cNvSpPr>
+            <a:spLocks noGrp="1" noRot="1" noChangeAspect="1" noMove="1" noResize="1" noEditPoints="1" noAdjustHandles="1" noChangeArrowheads="1" noChangeShapeType="1" noTextEdit="1"/>
+          </p:cNvSpPr>
+          <p:nvPr>
+            <p:extLst>
+              <p:ext uri="{386F3935-93C4-4BCD-93E2-E3B085C9AB24}">
+                <p16:designElem xmlns:p16="http://schemas.microsoft.com/office/powerpoint/2015/main" val="1"/>
+              </p:ext>
+            </p:extLst>
+          </p:nvPr>
+        </p:nvSpPr>
+        <p:spPr>
+          <a:xfrm>
+            <a:off x="3175" y="6400800"/>
+            <a:ext cx="12188825" cy="457200"/>
+          </a:xfrm>
+          <a:prstGeom prst="rect">
+            <a:avLst/>
+          </a:prstGeom>
+          <a:solidFill>
+            <a:schemeClr val="accent2"/>
+          </a:solidFill>
+          <a:ln>
+            <a:noFill/>
+          </a:ln>
+        </p:spPr>
+        <p:style>
+          <a:lnRef idx="2">
+            <a:schemeClr val="accent1">
+              <a:shade val="50000"/>
+            </a:schemeClr>
+          </a:lnRef>
+          <a:fillRef idx="1">
+            <a:schemeClr val="accent1"/>
+          </a:fillRef>
+          <a:effectRef idx="0">
+            <a:schemeClr val="accent1"/>
+          </a:effectRef>
+          <a:fontRef idx="minor">
+            <a:schemeClr val="lt1"/>
+          </a:fontRef>
+        </p:style>
+      </p:sp>
+      <p:sp>
+        <p:nvSpPr>
+          <p:cNvPr id="13" name="Rectangle 12">
+            <a:extLst>
+              <a:ext uri="{FF2B5EF4-FFF2-40B4-BE49-F238E27FC236}">
+                <a16:creationId xmlns:a16="http://schemas.microsoft.com/office/drawing/2014/main" id="{8ECA9D09-8011-4ADA-AC83-425AD46E8741}"/>
+              </a:ext>
+              <a:ext uri="{C183D7F6-B498-43B3-948B-1728B52AA6E4}">
+                <adec:decorative xmlns:adec="http://schemas.microsoft.com/office/drawing/2017/decorative" val="1"/>
+              </a:ext>
+            </a:extLst>
+          </p:cNvPr>
+          <p:cNvSpPr>
+            <a:spLocks noGrp="1" noRot="1" noChangeAspect="1" noMove="1" noResize="1" noEditPoints="1" noAdjustHandles="1" noChangeArrowheads="1" noChangeShapeType="1" noTextEdit="1"/>
+          </p:cNvSpPr>
+          <p:nvPr>
+            <p:extLst>
+              <p:ext uri="{386F3935-93C4-4BCD-93E2-E3B085C9AB24}">
+                <p16:designElem xmlns:p16="http://schemas.microsoft.com/office/powerpoint/2015/main" val="1"/>
+              </p:ext>
+            </p:extLst>
+          </p:nvPr>
+        </p:nvSpPr>
+        <p:spPr>
+          <a:xfrm>
+            <a:off x="15" y="6334316"/>
+            <a:ext cx="12188825" cy="64008"/>
+          </a:xfrm>
+          <a:prstGeom prst="rect">
+            <a:avLst/>
+          </a:prstGeom>
+          <a:solidFill>
+            <a:schemeClr val="accent1"/>
+          </a:solidFill>
+          <a:ln>
+            <a:noFill/>
+          </a:ln>
+        </p:spPr>
+        <p:style>
+          <a:lnRef idx="2">
+            <a:schemeClr val="accent1">
+              <a:shade val="50000"/>
+            </a:schemeClr>
+          </a:lnRef>
+          <a:fillRef idx="1">
+            <a:schemeClr val="accent1"/>
+          </a:fillRef>
+          <a:effectRef idx="0">
+            <a:schemeClr val="accent1"/>
+          </a:effectRef>
+          <a:fontRef idx="minor">
+            <a:schemeClr val="lt1"/>
+          </a:fontRef>
+        </p:style>
+      </p:sp>
+      <p:cxnSp>
+        <p:nvCxnSpPr>
+          <p:cNvPr id="15" name="Straight Connector 14">
+            <a:extLst>
+              <a:ext uri="{FF2B5EF4-FFF2-40B4-BE49-F238E27FC236}">
+                <a16:creationId xmlns:a16="http://schemas.microsoft.com/office/drawing/2014/main" id="{12A25E9B-15F8-4123-8275-812AD89E2F3F}"/>
+              </a:ext>
+              <a:ext uri="{C183D7F6-B498-43B3-948B-1728B52AA6E4}">
+                <adec:decorative xmlns:adec="http://schemas.microsoft.com/office/drawing/2017/decorative" val="1"/>
+              </a:ext>
+            </a:extLst>
+          </p:cNvPr>
+          <p:cNvCxnSpPr>
+            <a:cxnSpLocks noGrp="1" noRot="1" noChangeAspect="1" noMove="1" noResize="1" noEditPoints="1" noAdjustHandles="1" noChangeArrowheads="1" noChangeShapeType="1"/>
+          </p:cNvCxnSpPr>
+          <p:nvPr>
+            <p:extLst>
+              <p:ext uri="{386F3935-93C4-4BCD-93E2-E3B085C9AB24}">
+                <p16:designElem xmlns:p16="http://schemas.microsoft.com/office/powerpoint/2015/main" val="1"/>
+              </p:ext>
+            </p:extLst>
+          </p:nvPr>
+        </p:nvCxnSpPr>
+        <p:spPr>
+          <a:xfrm>
+            <a:off x="1207658" y="4343400"/>
+            <a:ext cx="9875520" cy="0"/>
+          </a:xfrm>
+          <a:prstGeom prst="line">
+            <a:avLst/>
+          </a:prstGeom>
+          <a:ln w="6350">
+            <a:solidFill>
+              <a:schemeClr val="tx1">
+                <a:lumMod val="50000"/>
+                <a:lumOff val="50000"/>
+              </a:schemeClr>
+            </a:solidFill>
+          </a:ln>
+        </p:spPr>
+        <p:style>
+          <a:lnRef idx="1">
+            <a:schemeClr val="accent1"/>
+          </a:lnRef>
+          <a:fillRef idx="0">
+            <a:schemeClr val="accent1"/>
+          </a:fillRef>
+          <a:effectRef idx="0">
+            <a:schemeClr val="accent1"/>
+          </a:effectRef>
+          <a:fontRef idx="minor">
+            <a:schemeClr val="tx1"/>
+          </a:fontRef>
+        </p:style>
+      </p:cxnSp>
+      <p:sp useBgFill="1">
+        <p:nvSpPr>
+          <p:cNvPr id="17" name="Rectangle 16">
+            <a:extLst>
+              <a:ext uri="{FF2B5EF4-FFF2-40B4-BE49-F238E27FC236}">
+                <a16:creationId xmlns:a16="http://schemas.microsoft.com/office/drawing/2014/main" id="{1F9037C3-85A3-4BCB-88A2-ADB8F64D2514}"/>
+              </a:ext>
+              <a:ext uri="{C183D7F6-B498-43B3-948B-1728B52AA6E4}">
+                <adec:decorative xmlns:adec="http://schemas.microsoft.com/office/drawing/2017/decorative" val="1"/>
+              </a:ext>
+            </a:extLst>
+          </p:cNvPr>
+          <p:cNvSpPr>
+            <a:spLocks noGrp="1" noRot="1" noChangeAspect="1" noMove="1" noResize="1" noEditPoints="1" noAdjustHandles="1" noChangeArrowheads="1" noChangeShapeType="1" noTextEdit="1"/>
+          </p:cNvSpPr>
+          <p:nvPr>
+            <p:extLst>
+              <p:ext uri="{386F3935-93C4-4BCD-93E2-E3B085C9AB24}">
+                <p16:designElem xmlns:p16="http://schemas.microsoft.com/office/powerpoint/2015/main" val="1"/>
+              </p:ext>
+            </p:extLst>
+          </p:nvPr>
+        </p:nvSpPr>
+        <p:spPr>
+          <a:xfrm>
+            <a:off x="0" y="0"/>
+            <a:ext cx="12192001" cy="6334316"/>
+          </a:xfrm>
+          <a:prstGeom prst="rect">
+            <a:avLst/>
+          </a:prstGeom>
+          <a:ln>
+            <a:noFill/>
+          </a:ln>
+        </p:spPr>
+        <p:style>
+          <a:lnRef idx="2">
+            <a:schemeClr val="accent1">
+              <a:shade val="50000"/>
+            </a:schemeClr>
+          </a:lnRef>
+          <a:fillRef idx="1">
+            <a:schemeClr val="accent1"/>
+          </a:fillRef>
+          <a:effectRef idx="0">
+            <a:schemeClr val="accent1"/>
+          </a:effectRef>
+          <a:fontRef idx="minor">
+            <a:schemeClr val="lt1"/>
+          </a:fontRef>
+        </p:style>
+        <p:txBody>
+          <a:bodyPr rtlCol="0" anchor="ctr"/>
+          <a:lstStyle/>
+          <a:p>
+            <a:pPr algn="ctr"/>
+            <a:endParaRPr lang="en-US"/>
+          </a:p>
+        </p:txBody>
+      </p:sp>
+      <p:sp>
+        <p:nvSpPr>
+          <p:cNvPr id="2" name="Title 1">
+            <a:extLst>
+              <a:ext uri="{FF2B5EF4-FFF2-40B4-BE49-F238E27FC236}">
+                <a16:creationId xmlns:a16="http://schemas.microsoft.com/office/drawing/2014/main" id="{59587CA1-46A1-4F59-B364-C459CE03A71A}"/>
+              </a:ext>
+            </a:extLst>
+          </p:cNvPr>
+          <p:cNvSpPr>
+            <a:spLocks noGrp="1"/>
+          </p:cNvSpPr>
+          <p:nvPr>
+            <p:ph type="title"/>
+          </p:nvPr>
+        </p:nvSpPr>
+        <p:spPr>
+          <a:xfrm>
+            <a:off x="633999" y="4550229"/>
+            <a:ext cx="10909073" cy="1057655"/>
+          </a:xfrm>
+        </p:spPr>
+        <p:txBody>
+          <a:bodyPr vert="horz" lIns="91440" tIns="45720" rIns="91440" bIns="45720" rtlCol="0" anchor="b">
+            <a:normAutofit/>
+          </a:bodyPr>
+          <a:lstStyle/>
+          <a:p>
+            <a:r>
+              <a:rPr lang="en-US" sz="6000">
+                <a:solidFill>
+                  <a:schemeClr val="tx1">
+                    <a:lumMod val="85000"/>
+                    <a:lumOff val="15000"/>
+                  </a:schemeClr>
+                </a:solidFill>
+              </a:rPr>
+              <a:t>Challenges</a:t>
+            </a:r>
+          </a:p>
+        </p:txBody>
+      </p:sp>
+      <p:pic>
+        <p:nvPicPr>
+          <p:cNvPr id="5" name="Content Placeholder 4" descr="Chart&#10;&#10;Description automatically generated">
+            <a:extLst>
+              <a:ext uri="{FF2B5EF4-FFF2-40B4-BE49-F238E27FC236}">
+                <a16:creationId xmlns:a16="http://schemas.microsoft.com/office/drawing/2014/main" id="{5201FC71-05B9-4AFD-8E57-6E9CC5FF7F62}"/>
+              </a:ext>
+            </a:extLst>
+          </p:cNvPr>
+          <p:cNvPicPr>
+            <a:picLocks noGrp="1" noChangeAspect="1"/>
+          </p:cNvPicPr>
+          <p:nvPr>
+            <p:ph idx="1"/>
+          </p:nvPr>
+        </p:nvPicPr>
+        <p:blipFill>
+          <a:blip r:embed="rId2"/>
+          <a:stretch>
+            <a:fillRect/>
+          </a:stretch>
+        </p:blipFill>
+        <p:spPr>
+          <a:xfrm>
+            <a:off x="26702" y="1308409"/>
+            <a:ext cx="4157503" cy="2203476"/>
+          </a:xfrm>
+          <a:prstGeom prst="rect">
+            <a:avLst/>
+          </a:prstGeom>
+        </p:spPr>
+      </p:pic>
+      <p:sp>
+        <p:nvSpPr>
+          <p:cNvPr id="19" name="Rectangle 18">
+            <a:extLst>
+              <a:ext uri="{FF2B5EF4-FFF2-40B4-BE49-F238E27FC236}">
+                <a16:creationId xmlns:a16="http://schemas.microsoft.com/office/drawing/2014/main" id="{B69980A3-C206-42F5-BF92-5E9FB6E9676D}"/>
+              </a:ext>
+              <a:ext uri="{C183D7F6-B498-43B3-948B-1728B52AA6E4}">
+                <adec:decorative xmlns:adec="http://schemas.microsoft.com/office/drawing/2017/decorative" val="1"/>
+              </a:ext>
+            </a:extLst>
+          </p:cNvPr>
+          <p:cNvSpPr>
+            <a:spLocks noGrp="1" noRot="1" noChangeAspect="1" noMove="1" noResize="1" noEditPoints="1" noAdjustHandles="1" noChangeArrowheads="1" noChangeShapeType="1" noTextEdit="1"/>
+          </p:cNvSpPr>
+          <p:nvPr>
+            <p:extLst>
+              <p:ext uri="{386F3935-93C4-4BCD-93E2-E3B085C9AB24}">
+                <p16:designElem xmlns:p16="http://schemas.microsoft.com/office/powerpoint/2015/main" val="1"/>
+              </p:ext>
+            </p:extLst>
+          </p:nvPr>
+        </p:nvSpPr>
+        <p:spPr>
+          <a:xfrm>
+            <a:off x="4158553" y="886968"/>
+            <a:ext cx="64008" cy="3108960"/>
+          </a:xfrm>
+          <a:prstGeom prst="rect">
+            <a:avLst/>
+          </a:prstGeom>
+          <a:ln>
+            <a:noFill/>
+          </a:ln>
+        </p:spPr>
+        <p:style>
+          <a:lnRef idx="2">
+            <a:schemeClr val="accent1">
+              <a:shade val="50000"/>
+            </a:schemeClr>
+          </a:lnRef>
+          <a:fillRef idx="1">
+            <a:schemeClr val="accent1"/>
+          </a:fillRef>
+          <a:effectRef idx="0">
+            <a:schemeClr val="accent1"/>
+          </a:effectRef>
+          <a:fontRef idx="minor">
+            <a:schemeClr val="lt1"/>
+          </a:fontRef>
+        </p:style>
+        <p:txBody>
+          <a:bodyPr rtlCol="0" anchor="ctr"/>
+          <a:lstStyle/>
+          <a:p>
+            <a:pPr algn="ctr"/>
+            <a:endParaRPr lang="en-US"/>
+          </a:p>
+        </p:txBody>
+      </p:sp>
+      <p:pic>
+        <p:nvPicPr>
+          <p:cNvPr id="4" name="Picture 3" descr="Chart, bar chart&#10;&#10;Description automatically generated">
+            <a:extLst>
+              <a:ext uri="{FF2B5EF4-FFF2-40B4-BE49-F238E27FC236}">
+                <a16:creationId xmlns:a16="http://schemas.microsoft.com/office/drawing/2014/main" id="{C99C1740-8448-4621-A39D-1F23325BF5F9}"/>
+              </a:ext>
+            </a:extLst>
+          </p:cNvPr>
+          <p:cNvPicPr>
+            <a:picLocks noChangeAspect="1"/>
+          </p:cNvPicPr>
+          <p:nvPr/>
+        </p:nvPicPr>
+        <p:blipFill>
+          <a:blip r:embed="rId3"/>
+          <a:stretch>
+            <a:fillRect/>
+          </a:stretch>
+        </p:blipFill>
+        <p:spPr>
+          <a:xfrm>
+            <a:off x="4235181" y="1446429"/>
+            <a:ext cx="3706707" cy="1899687"/>
+          </a:xfrm>
+          <a:prstGeom prst="rect">
+            <a:avLst/>
+          </a:prstGeom>
+        </p:spPr>
+      </p:pic>
+      <p:sp>
+        <p:nvSpPr>
+          <p:cNvPr id="21" name="Rectangle 20">
+            <a:extLst>
+              <a:ext uri="{FF2B5EF4-FFF2-40B4-BE49-F238E27FC236}">
+                <a16:creationId xmlns:a16="http://schemas.microsoft.com/office/drawing/2014/main" id="{0B1AC6D6-1B75-4EA6-B60E-DBD2E3F4F807}"/>
+              </a:ext>
+              <a:ext uri="{C183D7F6-B498-43B3-948B-1728B52AA6E4}">
+                <adec:decorative xmlns:adec="http://schemas.microsoft.com/office/drawing/2017/decorative" val="1"/>
+              </a:ext>
+            </a:extLst>
+          </p:cNvPr>
+          <p:cNvSpPr>
+            <a:spLocks noGrp="1" noRot="1" noChangeAspect="1" noMove="1" noResize="1" noEditPoints="1" noAdjustHandles="1" noChangeArrowheads="1" noChangeShapeType="1" noTextEdit="1"/>
+          </p:cNvSpPr>
+          <p:nvPr>
+            <p:extLst>
+              <p:ext uri="{386F3935-93C4-4BCD-93E2-E3B085C9AB24}">
+                <p16:designElem xmlns:p16="http://schemas.microsoft.com/office/powerpoint/2015/main" val="1"/>
+              </p:ext>
+            </p:extLst>
+          </p:nvPr>
+        </p:nvSpPr>
+        <p:spPr>
+          <a:xfrm>
+            <a:off x="7955969" y="886968"/>
+            <a:ext cx="64008" cy="3108960"/>
+          </a:xfrm>
+          <a:prstGeom prst="rect">
+            <a:avLst/>
+          </a:prstGeom>
+          <a:ln>
+            <a:noFill/>
+          </a:ln>
+        </p:spPr>
+        <p:style>
+          <a:lnRef idx="2">
+            <a:schemeClr val="accent1">
+              <a:shade val="50000"/>
+            </a:schemeClr>
+          </a:lnRef>
+          <a:fillRef idx="1">
+            <a:schemeClr val="accent1"/>
+          </a:fillRef>
+          <a:effectRef idx="0">
+            <a:schemeClr val="accent1"/>
+          </a:effectRef>
+          <a:fontRef idx="minor">
+            <a:schemeClr val="lt1"/>
+          </a:fontRef>
+        </p:style>
+        <p:txBody>
+          <a:bodyPr rtlCol="0" anchor="ctr"/>
+          <a:lstStyle/>
+          <a:p>
+            <a:pPr algn="ctr"/>
+            <a:endParaRPr lang="en-US"/>
+          </a:p>
+        </p:txBody>
+      </p:sp>
+      <p:pic>
+        <p:nvPicPr>
+          <p:cNvPr id="6" name="Picture 5" descr="Chart, bar chart&#10;&#10;Description automatically generated">
+            <a:extLst>
+              <a:ext uri="{FF2B5EF4-FFF2-40B4-BE49-F238E27FC236}">
+                <a16:creationId xmlns:a16="http://schemas.microsoft.com/office/drawing/2014/main" id="{B20E12BF-88A3-4CB8-AB74-C001B941E4EB}"/>
+              </a:ext>
+            </a:extLst>
+          </p:cNvPr>
+          <p:cNvPicPr>
+            <a:picLocks noChangeAspect="1"/>
+          </p:cNvPicPr>
+          <p:nvPr/>
+        </p:nvPicPr>
+        <p:blipFill>
+          <a:blip r:embed="rId4"/>
+          <a:stretch>
+            <a:fillRect/>
+          </a:stretch>
+        </p:blipFill>
+        <p:spPr>
+          <a:xfrm>
+            <a:off x="8049853" y="1308409"/>
+            <a:ext cx="4114182" cy="2159945"/>
+          </a:xfrm>
+          <a:prstGeom prst="rect">
+            <a:avLst/>
+          </a:prstGeom>
+        </p:spPr>
+      </p:pic>
+      <p:cxnSp>
+        <p:nvCxnSpPr>
+          <p:cNvPr id="23" name="Straight Connector 22">
+            <a:extLst>
+              <a:ext uri="{FF2B5EF4-FFF2-40B4-BE49-F238E27FC236}">
+                <a16:creationId xmlns:a16="http://schemas.microsoft.com/office/drawing/2014/main" id="{0A9E7251-BA01-4FA8-B283-706FBA6CE251}"/>
+              </a:ext>
+              <a:ext uri="{C183D7F6-B498-43B3-948B-1728B52AA6E4}">
+                <adec:decorative xmlns:adec="http://schemas.microsoft.com/office/drawing/2017/decorative" val="1"/>
+              </a:ext>
+            </a:extLst>
+          </p:cNvPr>
+          <p:cNvCxnSpPr>
+            <a:cxnSpLocks noGrp="1" noRot="1" noChangeAspect="1" noMove="1" noResize="1" noEditPoints="1" noAdjustHandles="1" noChangeArrowheads="1" noChangeShapeType="1"/>
+          </p:cNvCxnSpPr>
+          <p:nvPr>
+            <p:extLst>
+              <p:ext uri="{386F3935-93C4-4BCD-93E2-E3B085C9AB24}">
+                <p16:designElem xmlns:p16="http://schemas.microsoft.com/office/powerpoint/2015/main" val="1"/>
+              </p:ext>
+            </p:extLst>
+          </p:nvPr>
+        </p:nvCxnSpPr>
+        <p:spPr>
+          <a:xfrm>
+            <a:off x="721086" y="5618770"/>
+            <a:ext cx="10515600" cy="0"/>
+          </a:xfrm>
+          <a:prstGeom prst="line">
+            <a:avLst/>
+          </a:prstGeom>
+          <a:ln w="6350">
+            <a:solidFill>
+              <a:schemeClr val="tx2">
+                <a:alpha val="90000"/>
+              </a:schemeClr>
+            </a:solidFill>
+          </a:ln>
+        </p:spPr>
+        <p:style>
+          <a:lnRef idx="1">
+            <a:schemeClr val="accent1"/>
+          </a:lnRef>
+          <a:fillRef idx="0">
+            <a:schemeClr val="accent1"/>
+          </a:fillRef>
+          <a:effectRef idx="0">
+            <a:schemeClr val="accent1"/>
+          </a:effectRef>
+          <a:fontRef idx="minor">
+            <a:schemeClr val="tx1"/>
+          </a:fontRef>
+        </p:style>
+      </p:cxnSp>
+      <p:sp>
+        <p:nvSpPr>
+          <p:cNvPr id="25" name="Rectangle 24">
+            <a:extLst>
+              <a:ext uri="{FF2B5EF4-FFF2-40B4-BE49-F238E27FC236}">
+                <a16:creationId xmlns:a16="http://schemas.microsoft.com/office/drawing/2014/main" id="{8224CB75-6074-47E8-ABC3-6651B39FCB75}"/>
+              </a:ext>
+              <a:ext uri="{C183D7F6-B498-43B3-948B-1728B52AA6E4}">
+                <adec:decorative xmlns:adec="http://schemas.microsoft.com/office/drawing/2017/decorative" val="1"/>
+              </a:ext>
+            </a:extLst>
+          </p:cNvPr>
+          <p:cNvSpPr>
+            <a:spLocks noGrp="1" noRot="1" noChangeAspect="1" noMove="1" noResize="1" noEditPoints="1" noAdjustHandles="1" noChangeArrowheads="1" noChangeShapeType="1" noTextEdit="1"/>
+          </p:cNvSpPr>
+          <p:nvPr>
+            <p:extLst>
+              <p:ext uri="{386F3935-93C4-4BCD-93E2-E3B085C9AB24}">
+                <p16:designElem xmlns:p16="http://schemas.microsoft.com/office/powerpoint/2015/main" val="1"/>
+              </p:ext>
+            </p:extLst>
+          </p:nvPr>
+        </p:nvSpPr>
+        <p:spPr>
+          <a:xfrm>
+            <a:off x="15" y="6334316"/>
+            <a:ext cx="12191985" cy="66484"/>
+          </a:xfrm>
+          <a:prstGeom prst="rect">
+            <a:avLst/>
+          </a:prstGeom>
+          <a:solidFill>
+            <a:schemeClr val="accent1"/>
+          </a:solidFill>
+          <a:ln>
+            <a:noFill/>
+          </a:ln>
+        </p:spPr>
+        <p:style>
+          <a:lnRef idx="2">
+            <a:schemeClr val="accent1">
+              <a:shade val="50000"/>
+            </a:schemeClr>
+          </a:lnRef>
+          <a:fillRef idx="1">
+            <a:schemeClr val="accent1"/>
+          </a:fillRef>
+          <a:effectRef idx="0">
+            <a:schemeClr val="accent1"/>
+          </a:effectRef>
+          <a:fontRef idx="minor">
+            <a:schemeClr val="lt1"/>
+          </a:fontRef>
+        </p:style>
+      </p:sp>
+      <p:sp>
+        <p:nvSpPr>
+          <p:cNvPr id="27" name="Rectangle 26">
+            <a:extLst>
+              <a:ext uri="{FF2B5EF4-FFF2-40B4-BE49-F238E27FC236}">
+                <a16:creationId xmlns:a16="http://schemas.microsoft.com/office/drawing/2014/main" id="{317E8644-19CA-4B48-8CF2-BE1FF1444C63}"/>
+              </a:ext>
+              <a:ext uri="{C183D7F6-B498-43B3-948B-1728B52AA6E4}">
+                <adec:decorative xmlns:adec="http://schemas.microsoft.com/office/drawing/2017/decorative" val="1"/>
+              </a:ext>
+            </a:extLst>
+          </p:cNvPr>
+          <p:cNvSpPr>
+            <a:spLocks noGrp="1" noRot="1" noChangeAspect="1" noMove="1" noResize="1" noEditPoints="1" noAdjustHandles="1" noChangeArrowheads="1" noChangeShapeType="1" noTextEdit="1"/>
+          </p:cNvSpPr>
+          <p:nvPr>
+            <p:extLst>
+              <p:ext uri="{386F3935-93C4-4BCD-93E2-E3B085C9AB24}">
+                <p16:designElem xmlns:p16="http://schemas.microsoft.com/office/powerpoint/2015/main" val="1"/>
+              </p:ext>
+            </p:extLst>
+          </p:nvPr>
+        </p:nvSpPr>
+        <p:spPr>
+          <a:xfrm>
+            <a:off x="1" y="6400800"/>
+            <a:ext cx="12192000" cy="457200"/>
+          </a:xfrm>
+          <a:prstGeom prst="rect">
+            <a:avLst/>
+          </a:prstGeom>
+          <a:solidFill>
+            <a:schemeClr val="accent2"/>
+          </a:solidFill>
+          <a:ln>
+            <a:noFill/>
+          </a:ln>
+        </p:spPr>
+        <p:style>
+          <a:lnRef idx="2">
+            <a:schemeClr val="accent1">
+              <a:shade val="50000"/>
+            </a:schemeClr>
+          </a:lnRef>
+          <a:fillRef idx="1">
+            <a:schemeClr val="accent1"/>
+          </a:fillRef>
+          <a:effectRef idx="0">
+            <a:schemeClr val="accent1"/>
+          </a:effectRef>
+          <a:fontRef idx="minor">
+            <a:schemeClr val="lt1"/>
+          </a:fontRef>
+        </p:style>
+      </p:sp>
+    </p:spTree>
+    <p:extLst>
+      <p:ext uri="{BB962C8B-B14F-4D97-AF65-F5344CB8AC3E}">
+        <p14:creationId xmlns:p14="http://schemas.microsoft.com/office/powerpoint/2010/main" val="1760442444"/>
+      </p:ext>
+    </p:extLst>
+  </p:cSld>
+  <p:clrMapOvr>
+    <a:masterClrMapping/>
+  </p:clrMapOvr>
+</p:sld>
+</file>
+
+<file path=ppt/slides/slide11.xml><?xml version="1.0" encoding="utf-8"?>
+<p:sld xmlns:a="http://schemas.openxmlformats.org/drawingml/2006/main" xmlns:r="http://schemas.openxmlformats.org/officeDocument/2006/relationships" xmlns:p="http://schemas.openxmlformats.org/presentationml/2006/main">
+  <p:cSld>
+    <p:spTree>
+      <p:nvGrpSpPr>
+        <p:cNvPr id="1" name=""/>
+        <p:cNvGrpSpPr/>
+        <p:nvPr/>
+      </p:nvGrpSpPr>
+      <p:grpSpPr>
+        <a:xfrm>
+          <a:off x="0" y="0"/>
+          <a:ext cx="0" cy="0"/>
+          <a:chOff x="0" y="0"/>
+          <a:chExt cx="0" cy="0"/>
+        </a:xfrm>
+      </p:grpSpPr>
+      <p:sp>
+        <p:nvSpPr>
           <p:cNvPr id="2" name="Title 1">
             <a:extLst>
               <a:ext uri="{FF2B5EF4-FFF2-40B4-BE49-F238E27FC236}">
@@ -4054,7 +4736,7 @@
 </p:sld>
 </file>
 
-<file path=ppt/slides/slide11.xml><?xml version="1.0" encoding="utf-8"?>
+<file path=ppt/slides/slide12.xml><?xml version="1.0" encoding="utf-8"?>
 <p:sld xmlns:a="http://schemas.openxmlformats.org/drawingml/2006/main" xmlns:r="http://schemas.openxmlformats.org/officeDocument/2006/relationships" xmlns:p="http://schemas.openxmlformats.org/presentationml/2006/main">
   <p:cSld>
     <p:spTree>
@@ -4494,10 +5176,10 @@
       </p:grpSpPr>
       <p:sp>
         <p:nvSpPr>
-          <p:cNvPr id="2" name="Title 1">
+          <p:cNvPr id="6" name="Title 1">
             <a:extLst>
               <a:ext uri="{FF2B5EF4-FFF2-40B4-BE49-F238E27FC236}">
-                <a16:creationId xmlns:a16="http://schemas.microsoft.com/office/drawing/2014/main" id="{EC451B73-9F85-472B-B674-BD5E8B2D3C38}"/>
+                <a16:creationId xmlns:a16="http://schemas.microsoft.com/office/drawing/2014/main" id="{D75008F6-60C8-4A6F-8F01-BDEC1B46AE4F}"/>
               </a:ext>
             </a:extLst>
           </p:cNvPr>
@@ -4508,24 +5190,29 @@
             <p:ph type="title"/>
           </p:nvPr>
         </p:nvSpPr>
-        <p:spPr/>
+        <p:spPr>
+          <a:xfrm>
+            <a:off x="1097280" y="286603"/>
+            <a:ext cx="10058400" cy="1450757"/>
+          </a:xfrm>
+        </p:spPr>
         <p:txBody>
           <a:bodyPr/>
           <a:lstStyle/>
           <a:p>
             <a:r>
               <a:rPr lang="en-US" dirty="0"/>
-              <a:t>Data</a:t>
-            </a:r>
-          </a:p>
-        </p:txBody>
-      </p:sp>
-      <p:sp>
-        <p:nvSpPr>
-          <p:cNvPr id="3" name="Content Placeholder 2">
+              <a:t>Data Sources</a:t>
+            </a:r>
+          </a:p>
+        </p:txBody>
+      </p:sp>
+      <p:sp>
+        <p:nvSpPr>
+          <p:cNvPr id="7" name="Content Placeholder 2">
             <a:extLst>
               <a:ext uri="{FF2B5EF4-FFF2-40B4-BE49-F238E27FC236}">
-                <a16:creationId xmlns:a16="http://schemas.microsoft.com/office/drawing/2014/main" id="{0F5A6379-8936-498A-A59D-47EF50B1EC6F}"/>
+                <a16:creationId xmlns:a16="http://schemas.microsoft.com/office/drawing/2014/main" id="{65D3A5C2-0EC5-491F-928A-6982B47CBC09}"/>
               </a:ext>
             </a:extLst>
           </p:cNvPr>
@@ -4536,148 +5223,151 @@
             <p:ph idx="1"/>
           </p:nvPr>
         </p:nvSpPr>
-        <p:spPr/>
+        <p:spPr>
+          <a:xfrm>
+            <a:off x="1097280" y="1845734"/>
+            <a:ext cx="10058400" cy="4023360"/>
+          </a:xfrm>
+        </p:spPr>
         <p:txBody>
           <a:bodyPr>
-            <a:normAutofit lnSpcReduction="10000"/>
+            <a:noAutofit/>
           </a:bodyPr>
           <a:lstStyle/>
           <a:p>
-            <a:pPr>
-              <a:buFont typeface="Arial" panose="020B0604020202020204" pitchFamily="34" charset="0"/>
-              <a:buChar char="•"/>
+            <a:pPr marL="0" indent="0">
+              <a:buNone/>
             </a:pPr>
             <a:r>
-              <a:rPr lang="en-US" dirty="0"/>
-              <a:t> Panel data collected at the county level, giving more observations to conduct the analysis.</a:t>
-            </a:r>
-          </a:p>
-          <a:p>
-            <a:pPr>
-              <a:buFont typeface="Arial" panose="020B0604020202020204" pitchFamily="34" charset="0"/>
-              <a:buChar char="•"/>
+              <a:rPr lang="en-US" sz="1100" dirty="0"/>
+              <a:t>Death Penalty Information Center - DeathPenaltyinfo.org</a:t>
+            </a:r>
+          </a:p>
+          <a:p>
+            <a:pPr lvl="1"/>
+            <a:r>
+              <a:rPr lang="en-US" sz="1100" dirty="0"/>
+              <a:t>-Non-profit organization based in Washington DC providing data and research related to capital punishment. </a:t>
+            </a:r>
+          </a:p>
+          <a:p>
+            <a:pPr lvl="1"/>
+            <a:r>
+              <a:rPr lang="en-US" sz="1100" dirty="0"/>
+              <a:t>-Provided County-level data on executions since 1977</a:t>
+            </a:r>
+          </a:p>
+          <a:p>
+            <a:pPr marL="0" indent="0">
+              <a:buNone/>
             </a:pPr>
             <a:r>
-              <a:rPr lang="en-US" dirty="0"/>
-              <a:t> Murder rate (</a:t>
-            </a:r>
-            <a:r>
-              <a:rPr lang="en-US" i="1" dirty="0"/>
-              <a:t>murdrate</a:t>
-            </a:r>
-            <a:r>
-              <a:rPr lang="en-US" dirty="0"/>
-              <a:t>) measures the number of murders out of 10,000 each county experiences year-by-year.</a:t>
-            </a:r>
-          </a:p>
-          <a:p>
-            <a:pPr>
-              <a:buFont typeface="Arial" panose="020B0604020202020204" pitchFamily="34" charset="0"/>
-              <a:buChar char="•"/>
+              <a:rPr lang="en-US" sz="1100" dirty="0"/>
+              <a:t>Uniform Crime Reports (UCR)</a:t>
+            </a:r>
+          </a:p>
+          <a:p>
+            <a:pPr lvl="1"/>
+            <a:r>
+              <a:rPr lang="en-US" sz="1100" dirty="0"/>
+              <a:t>-FBI Program providing administrative data and analysis on law enforcement and activity</a:t>
+            </a:r>
+          </a:p>
+          <a:p>
+            <a:pPr lvl="1"/>
+            <a:r>
+              <a:rPr lang="en-US" sz="1100" dirty="0"/>
+              <a:t>-Provided annual data on number of murders and homicide arrests</a:t>
+            </a:r>
+          </a:p>
+          <a:p>
+            <a:r>
+              <a:rPr lang="en-US" sz="1100" dirty="0"/>
+              <a:t>U.S. Census Bureau</a:t>
+            </a:r>
+          </a:p>
+          <a:p>
+            <a:pPr lvl="1"/>
+            <a:r>
+              <a:rPr lang="en-US" sz="1100" dirty="0"/>
+              <a:t>-Population</a:t>
+            </a:r>
+          </a:p>
+          <a:p>
+            <a:pPr lvl="2"/>
+            <a:r>
+              <a:rPr lang="en-US" sz="1100" dirty="0"/>
+              <a:t>County totals, density</a:t>
+            </a:r>
+          </a:p>
+          <a:p>
+            <a:pPr lvl="1"/>
+            <a:r>
+              <a:rPr lang="en-US" sz="1100" dirty="0"/>
+              <a:t>Demographic</a:t>
+            </a:r>
+          </a:p>
+          <a:p>
+            <a:pPr lvl="2"/>
+            <a:r>
+              <a:rPr lang="en-US" sz="1100" dirty="0"/>
+              <a:t>% age groups 10-19,20-29</a:t>
+            </a:r>
+          </a:p>
+          <a:p>
+            <a:pPr lvl="2"/>
+            <a:r>
+              <a:rPr lang="en-US" sz="1100" dirty="0"/>
+              <a:t>Race</a:t>
+            </a:r>
+          </a:p>
+          <a:p>
+            <a:pPr lvl="2"/>
+            <a:r>
+              <a:rPr lang="en-US" sz="1100" dirty="0"/>
+              <a:t>Sex </a:t>
+            </a:r>
+          </a:p>
+          <a:p>
+            <a:pPr lvl="1"/>
+            <a:r>
+              <a:rPr lang="en-US" sz="1100" dirty="0"/>
+              <a:t>Economic</a:t>
+            </a:r>
+          </a:p>
+          <a:p>
+            <a:pPr lvl="2"/>
+            <a:r>
+              <a:rPr lang="en-US" sz="1100" dirty="0"/>
+              <a:t>Per-capita income</a:t>
+            </a:r>
+          </a:p>
+          <a:p>
+            <a:pPr lvl="2"/>
+            <a:r>
+              <a:rPr lang="en-US" sz="1100" dirty="0"/>
+              <a:t>Per-capita income maintenance </a:t>
+            </a:r>
+          </a:p>
+          <a:p>
+            <a:pPr lvl="2"/>
+            <a:r>
+              <a:rPr lang="en-US" sz="1100" dirty="0"/>
+              <a:t>Per-capita unemployment insurance</a:t>
+            </a:r>
+          </a:p>
+          <a:p>
+            <a:pPr marL="384048" lvl="2" indent="0">
+              <a:buNone/>
             </a:pPr>
-            <a:r>
-              <a:rPr lang="en-US" dirty="0"/>
-              <a:t> Execution rate (</a:t>
-            </a:r>
-            <a:r>
-              <a:rPr lang="en-US" i="1" dirty="0"/>
-              <a:t>execrate) </a:t>
-            </a:r>
-            <a:r>
-              <a:rPr lang="en-US" dirty="0"/>
-              <a:t>measures the number of executions per 10,000 people in each county</a:t>
-            </a:r>
-            <a:r>
-              <a:rPr lang="en-US" i="1" dirty="0"/>
-              <a:t>.</a:t>
-            </a:r>
-          </a:p>
-          <a:p>
-            <a:pPr>
-              <a:buFont typeface="Arial" panose="020B0604020202020204" pitchFamily="34" charset="0"/>
-              <a:buChar char="•"/>
-            </a:pPr>
-            <a:r>
-              <a:rPr lang="en-US" dirty="0"/>
-              <a:t> A total of 272,159 murders.</a:t>
-            </a:r>
-          </a:p>
-          <a:p>
-            <a:pPr>
-              <a:buFont typeface="Arial" panose="020B0604020202020204" pitchFamily="34" charset="0"/>
-              <a:buChar char="•"/>
-            </a:pPr>
-            <a:r>
-              <a:rPr lang="en-US" dirty="0"/>
-              <a:t> A total of 256 executions.</a:t>
-            </a:r>
-          </a:p>
-          <a:p>
-            <a:pPr>
-              <a:buFont typeface="Arial" panose="020B0604020202020204" pitchFamily="34" charset="0"/>
-              <a:buChar char="•"/>
-            </a:pPr>
-            <a:r>
-              <a:rPr lang="en-US" dirty="0"/>
-              <a:t> 16 years of data collected, a total of 37,349 observations. Years 1980-1996.</a:t>
-            </a:r>
-          </a:p>
-          <a:p>
-            <a:pPr>
-              <a:buFont typeface="Arial" panose="020B0604020202020204" pitchFamily="34" charset="0"/>
-              <a:buChar char="•"/>
-            </a:pPr>
-            <a:r>
-              <a:rPr lang="en-US" dirty="0"/>
-              <a:t> Data includes economic, demographic, arrests for murder, and homicide/execution rates.</a:t>
-            </a:r>
-          </a:p>
-          <a:p>
-            <a:pPr>
-              <a:buFont typeface="Arial" panose="020B0604020202020204" pitchFamily="34" charset="0"/>
-              <a:buChar char="•"/>
-            </a:pPr>
-            <a:r>
-              <a:rPr lang="en-US" dirty="0"/>
-              <a:t> Due to counties having a value of zero for certain observations, log cannot be used for variables that include zero.</a:t>
-            </a:r>
-          </a:p>
-        </p:txBody>
-      </p:sp>
-      <p:pic>
-        <p:nvPicPr>
-          <p:cNvPr id="4" name="Picture 3">
-            <a:extLst>
-              <a:ext uri="{FF2B5EF4-FFF2-40B4-BE49-F238E27FC236}">
-                <a16:creationId xmlns:a16="http://schemas.microsoft.com/office/drawing/2014/main" id="{FAEEA4EE-2FC9-4AA8-9D4A-172575969D07}"/>
-              </a:ext>
-            </a:extLst>
-          </p:cNvPr>
-          <p:cNvPicPr>
-            <a:picLocks noChangeAspect="1"/>
-          </p:cNvPicPr>
-          <p:nvPr/>
-        </p:nvPicPr>
-        <p:blipFill>
-          <a:blip r:embed="rId2"/>
-          <a:stretch>
-            <a:fillRect/>
-          </a:stretch>
-        </p:blipFill>
-        <p:spPr>
-          <a:xfrm>
-            <a:off x="4335780" y="3330719"/>
-            <a:ext cx="4800600" cy="695325"/>
-          </a:xfrm>
-          <a:prstGeom prst="rect">
-            <a:avLst/>
-          </a:prstGeom>
-        </p:spPr>
-      </p:pic>
+            <a:endParaRPr lang="en-US" sz="1100" dirty="0"/>
+          </a:p>
+        </p:txBody>
+      </p:sp>
     </p:spTree>
     <p:extLst>
       <p:ext uri="{BB962C8B-B14F-4D97-AF65-F5344CB8AC3E}">
-        <p14:creationId xmlns:p14="http://schemas.microsoft.com/office/powerpoint/2010/main" val="2723165348"/>
+        <p14:creationId xmlns:p14="http://schemas.microsoft.com/office/powerpoint/2010/main" val="3632455330"/>
       </p:ext>
     </p:extLst>
   </p:cSld>
@@ -4709,7 +5399,7 @@
           <p:cNvPr id="2" name="Title 1">
             <a:extLst>
               <a:ext uri="{FF2B5EF4-FFF2-40B4-BE49-F238E27FC236}">
-                <a16:creationId xmlns:a16="http://schemas.microsoft.com/office/drawing/2014/main" id="{ECE8AD23-F2B0-4B42-B914-01A961D9B2FF}"/>
+                <a16:creationId xmlns:a16="http://schemas.microsoft.com/office/drawing/2014/main" id="{EC451B73-9F85-472B-B674-BD5E8B2D3C38}"/>
               </a:ext>
             </a:extLst>
           </p:cNvPr>
@@ -4726,10 +5416,9 @@
           <a:lstStyle/>
           <a:p>
             <a:r>
-              <a:rPr lang="en-US"/>
-              <a:t>Methods</a:t>
-            </a:r>
-            <a:endParaRPr lang="en-US" dirty="0"/>
+              <a:rPr lang="en-US" dirty="0"/>
+              <a:t>Data</a:t>
+            </a:r>
           </a:p>
         </p:txBody>
       </p:sp>
@@ -4738,7 +5427,7 @@
           <p:cNvPr id="3" name="Content Placeholder 2">
             <a:extLst>
               <a:ext uri="{FF2B5EF4-FFF2-40B4-BE49-F238E27FC236}">
-                <a16:creationId xmlns:a16="http://schemas.microsoft.com/office/drawing/2014/main" id="{BA2FC6CC-2794-4B53-AE89-764DE0633F06}"/>
+                <a16:creationId xmlns:a16="http://schemas.microsoft.com/office/drawing/2014/main" id="{0F5A6379-8936-498A-A59D-47EF50B1EC6F}"/>
               </a:ext>
             </a:extLst>
           </p:cNvPr>
@@ -4751,7 +5440,9 @@
         </p:nvSpPr>
         <p:spPr/>
         <p:txBody>
-          <a:bodyPr/>
+          <a:bodyPr>
+            <a:normAutofit lnSpcReduction="10000"/>
+          </a:bodyPr>
           <a:lstStyle/>
           <a:p>
             <a:pPr>
@@ -4760,7 +5451,7 @@
             </a:pPr>
             <a:r>
               <a:rPr lang="en-US" dirty="0"/>
-              <a:t> Scale economic control variables to log form, no observations with a value of zero.</a:t>
+              <a:t> Panel data collected at the county level, giving more observations to conduct the analysis.</a:t>
             </a:r>
           </a:p>
           <a:p>
@@ -4770,7 +5461,15 @@
             </a:pPr>
             <a:r>
               <a:rPr lang="en-US" dirty="0"/>
-              <a:t> Control for economic and demographic variables.</a:t>
+              <a:t> Murder rate (</a:t>
+            </a:r>
+            <a:r>
+              <a:rPr lang="en-US" i="1" dirty="0"/>
+              <a:t>murdrate</a:t>
+            </a:r>
+            <a:r>
+              <a:rPr lang="en-US" dirty="0"/>
+              <a:t>) measures the number of murders out of 10,000 each county experiences year-by-year.</a:t>
             </a:r>
           </a:p>
           <a:p>
@@ -4780,11 +5479,19 @@
             </a:pPr>
             <a:r>
               <a:rPr lang="en-US" dirty="0"/>
-              <a:t> 4 years of lag variables for </a:t>
+              <a:t> Execution rate (</a:t>
             </a:r>
             <a:r>
               <a:rPr lang="en-US" i="1" dirty="0"/>
-              <a:t>execrate.</a:t>
+              <a:t>execrate) </a:t>
+            </a:r>
+            <a:r>
+              <a:rPr lang="en-US" dirty="0"/>
+              <a:t>measures the number of executions per 10,000 people in each county</a:t>
+            </a:r>
+            <a:r>
+              <a:rPr lang="en-US" i="1" dirty="0"/>
+              <a:t>.</a:t>
             </a:r>
           </a:p>
           <a:p>
@@ -4793,12 +5500,8 @@
               <a:buChar char="•"/>
             </a:pPr>
             <a:r>
-              <a:rPr lang="en-US" i="1" dirty="0"/>
-              <a:t> </a:t>
-            </a:r>
-            <a:r>
               <a:rPr lang="en-US" dirty="0"/>
-              <a:t>Dummy variables for each year.</a:t>
+              <a:t> A total of 272,159 murders.</a:t>
             </a:r>
           </a:p>
           <a:p>
@@ -4808,7 +5511,7 @@
             </a:pPr>
             <a:r>
               <a:rPr lang="en-US" dirty="0"/>
-              <a:t> FE estimation to rid unobserved variables that do not change over time – assist with omitted variable bias.</a:t>
+              <a:t> A total of 256 executions.</a:t>
             </a:r>
           </a:p>
           <a:p>
@@ -4818,7 +5521,7 @@
             </a:pPr>
             <a:r>
               <a:rPr lang="en-US" dirty="0"/>
-              <a:t> Cluster robust method to account for heteroskedasticity.</a:t>
+              <a:t> 16 years of data collected, a total of 37,349 observations. Years 1980-1996.</a:t>
             </a:r>
           </a:p>
           <a:p>
@@ -4828,34 +5531,55 @@
             </a:pPr>
             <a:r>
               <a:rPr lang="en-US" dirty="0"/>
-              <a:t> Sum lag variables for long-run effects of </a:t>
-            </a:r>
-            <a:r>
-              <a:rPr lang="en-US" i="1" dirty="0"/>
-              <a:t>execrate </a:t>
-            </a:r>
+              <a:t> Data includes economic, demographic, arrests for murder, and homicide/execution rates.</a:t>
+            </a:r>
+          </a:p>
+          <a:p>
+            <a:pPr>
+              <a:buFont typeface="Arial" panose="020B0604020202020204" pitchFamily="34" charset="0"/>
+              <a:buChar char="•"/>
+            </a:pPr>
             <a:r>
               <a:rPr lang="en-US" dirty="0"/>
-              <a:t>on </a:t>
-            </a:r>
-            <a:r>
-              <a:rPr lang="en-US" i="1" dirty="0"/>
-              <a:t>murdrate</a:t>
-            </a:r>
-            <a:r>
-              <a:rPr lang="en-US" dirty="0"/>
-              <a:t>.</a:t>
-            </a:r>
-          </a:p>
-          <a:p>
-            <a:endParaRPr lang="en-US" dirty="0"/>
-          </a:p>
-        </p:txBody>
-      </p:sp>
+              <a:t> Due to counties having a value of zero for certain observations, log cannot be used for variables that include zero.</a:t>
+            </a:r>
+          </a:p>
+        </p:txBody>
+      </p:sp>
+      <p:pic>
+        <p:nvPicPr>
+          <p:cNvPr id="4" name="Picture 3">
+            <a:extLst>
+              <a:ext uri="{FF2B5EF4-FFF2-40B4-BE49-F238E27FC236}">
+                <a16:creationId xmlns:a16="http://schemas.microsoft.com/office/drawing/2014/main" id="{FAEEA4EE-2FC9-4AA8-9D4A-172575969D07}"/>
+              </a:ext>
+            </a:extLst>
+          </p:cNvPr>
+          <p:cNvPicPr>
+            <a:picLocks noChangeAspect="1"/>
+          </p:cNvPicPr>
+          <p:nvPr/>
+        </p:nvPicPr>
+        <p:blipFill>
+          <a:blip r:embed="rId2"/>
+          <a:stretch>
+            <a:fillRect/>
+          </a:stretch>
+        </p:blipFill>
+        <p:spPr>
+          <a:xfrm>
+            <a:off x="4335780" y="3330719"/>
+            <a:ext cx="4800600" cy="695325"/>
+          </a:xfrm>
+          <a:prstGeom prst="rect">
+            <a:avLst/>
+          </a:prstGeom>
+        </p:spPr>
+      </p:pic>
     </p:spTree>
     <p:extLst>
       <p:ext uri="{BB962C8B-B14F-4D97-AF65-F5344CB8AC3E}">
-        <p14:creationId xmlns:p14="http://schemas.microsoft.com/office/powerpoint/2010/main" val="1753864867"/>
+        <p14:creationId xmlns:p14="http://schemas.microsoft.com/office/powerpoint/2010/main" val="2723165348"/>
       </p:ext>
     </p:extLst>
   </p:cSld>
@@ -4887,6 +5611,184 @@
           <p:cNvPr id="2" name="Title 1">
             <a:extLst>
               <a:ext uri="{FF2B5EF4-FFF2-40B4-BE49-F238E27FC236}">
+                <a16:creationId xmlns:a16="http://schemas.microsoft.com/office/drawing/2014/main" id="{ECE8AD23-F2B0-4B42-B914-01A961D9B2FF}"/>
+              </a:ext>
+            </a:extLst>
+          </p:cNvPr>
+          <p:cNvSpPr>
+            <a:spLocks noGrp="1"/>
+          </p:cNvSpPr>
+          <p:nvPr>
+            <p:ph type="title"/>
+          </p:nvPr>
+        </p:nvSpPr>
+        <p:spPr/>
+        <p:txBody>
+          <a:bodyPr/>
+          <a:lstStyle/>
+          <a:p>
+            <a:r>
+              <a:rPr lang="en-US"/>
+              <a:t>Methods</a:t>
+            </a:r>
+            <a:endParaRPr lang="en-US" dirty="0"/>
+          </a:p>
+        </p:txBody>
+      </p:sp>
+      <p:sp>
+        <p:nvSpPr>
+          <p:cNvPr id="3" name="Content Placeholder 2">
+            <a:extLst>
+              <a:ext uri="{FF2B5EF4-FFF2-40B4-BE49-F238E27FC236}">
+                <a16:creationId xmlns:a16="http://schemas.microsoft.com/office/drawing/2014/main" id="{BA2FC6CC-2794-4B53-AE89-764DE0633F06}"/>
+              </a:ext>
+            </a:extLst>
+          </p:cNvPr>
+          <p:cNvSpPr>
+            <a:spLocks noGrp="1"/>
+          </p:cNvSpPr>
+          <p:nvPr>
+            <p:ph idx="1"/>
+          </p:nvPr>
+        </p:nvSpPr>
+        <p:spPr/>
+        <p:txBody>
+          <a:bodyPr/>
+          <a:lstStyle/>
+          <a:p>
+            <a:pPr>
+              <a:buFont typeface="Arial" panose="020B0604020202020204" pitchFamily="34" charset="0"/>
+              <a:buChar char="•"/>
+            </a:pPr>
+            <a:r>
+              <a:rPr lang="en-US" dirty="0"/>
+              <a:t> Scale economic control variables to log form, no observations with a value of zero.</a:t>
+            </a:r>
+          </a:p>
+          <a:p>
+            <a:pPr>
+              <a:buFont typeface="Arial" panose="020B0604020202020204" pitchFamily="34" charset="0"/>
+              <a:buChar char="•"/>
+            </a:pPr>
+            <a:r>
+              <a:rPr lang="en-US" dirty="0"/>
+              <a:t> Control for economic and demographic variables.</a:t>
+            </a:r>
+          </a:p>
+          <a:p>
+            <a:pPr>
+              <a:buFont typeface="Arial" panose="020B0604020202020204" pitchFamily="34" charset="0"/>
+              <a:buChar char="•"/>
+            </a:pPr>
+            <a:r>
+              <a:rPr lang="en-US" dirty="0"/>
+              <a:t> 4 years of lag variables for </a:t>
+            </a:r>
+            <a:r>
+              <a:rPr lang="en-US" i="1" dirty="0"/>
+              <a:t>execrate.</a:t>
+            </a:r>
+          </a:p>
+          <a:p>
+            <a:pPr>
+              <a:buFont typeface="Arial" panose="020B0604020202020204" pitchFamily="34" charset="0"/>
+              <a:buChar char="•"/>
+            </a:pPr>
+            <a:r>
+              <a:rPr lang="en-US" i="1" dirty="0"/>
+              <a:t> </a:t>
+            </a:r>
+            <a:r>
+              <a:rPr lang="en-US" dirty="0"/>
+              <a:t>Dummy variables for each year.</a:t>
+            </a:r>
+          </a:p>
+          <a:p>
+            <a:pPr>
+              <a:buFont typeface="Arial" panose="020B0604020202020204" pitchFamily="34" charset="0"/>
+              <a:buChar char="•"/>
+            </a:pPr>
+            <a:r>
+              <a:rPr lang="en-US" dirty="0"/>
+              <a:t> FE estimation to rid unobserved variables that do not change over time – assist with omitted variable bias.</a:t>
+            </a:r>
+          </a:p>
+          <a:p>
+            <a:pPr>
+              <a:buFont typeface="Arial" panose="020B0604020202020204" pitchFamily="34" charset="0"/>
+              <a:buChar char="•"/>
+            </a:pPr>
+            <a:r>
+              <a:rPr lang="en-US" dirty="0"/>
+              <a:t> Cluster robust method to account for heteroskedasticity.</a:t>
+            </a:r>
+          </a:p>
+          <a:p>
+            <a:pPr>
+              <a:buFont typeface="Arial" panose="020B0604020202020204" pitchFamily="34" charset="0"/>
+              <a:buChar char="•"/>
+            </a:pPr>
+            <a:r>
+              <a:rPr lang="en-US" dirty="0"/>
+              <a:t> Sum lag variables for long-run effects of </a:t>
+            </a:r>
+            <a:r>
+              <a:rPr lang="en-US" i="1" dirty="0"/>
+              <a:t>execrate </a:t>
+            </a:r>
+            <a:r>
+              <a:rPr lang="en-US" dirty="0"/>
+              <a:t>on </a:t>
+            </a:r>
+            <a:r>
+              <a:rPr lang="en-US" i="1" dirty="0"/>
+              <a:t>murdrate</a:t>
+            </a:r>
+            <a:r>
+              <a:rPr lang="en-US" dirty="0"/>
+              <a:t>.</a:t>
+            </a:r>
+          </a:p>
+          <a:p>
+            <a:endParaRPr lang="en-US" dirty="0"/>
+          </a:p>
+        </p:txBody>
+      </p:sp>
+    </p:spTree>
+    <p:extLst>
+      <p:ext uri="{BB962C8B-B14F-4D97-AF65-F5344CB8AC3E}">
+        <p14:creationId xmlns:p14="http://schemas.microsoft.com/office/powerpoint/2010/main" val="1753864867"/>
+      </p:ext>
+    </p:extLst>
+  </p:cSld>
+  <p:clrMapOvr>
+    <a:masterClrMapping/>
+  </p:clrMapOvr>
+</p:sld>
+</file>
+
+<file path=ppt/slides/slide7.xml><?xml version="1.0" encoding="utf-8"?>
+<p:sld xmlns:a="http://schemas.openxmlformats.org/drawingml/2006/main" xmlns:r="http://schemas.openxmlformats.org/officeDocument/2006/relationships" xmlns:p="http://schemas.openxmlformats.org/presentationml/2006/main">
+  <p:cSld>
+    <p:spTree>
+      <p:nvGrpSpPr>
+        <p:cNvPr id="1" name=""/>
+        <p:cNvGrpSpPr/>
+        <p:nvPr/>
+      </p:nvGrpSpPr>
+      <p:grpSpPr>
+        <a:xfrm>
+          <a:off x="0" y="0"/>
+          <a:ext cx="0" cy="0"/>
+          <a:chOff x="0" y="0"/>
+          <a:chExt cx="0" cy="0"/>
+        </a:xfrm>
+      </p:grpSpPr>
+      <p:sp>
+        <p:nvSpPr>
+          <p:cNvPr id="2" name="Title 1">
+            <a:extLst>
+              <a:ext uri="{FF2B5EF4-FFF2-40B4-BE49-F238E27FC236}">
                 <a16:creationId xmlns:a16="http://schemas.microsoft.com/office/drawing/2014/main" id="{EC451B73-9F85-472B-B674-BD5E8B2D3C38}"/>
               </a:ext>
             </a:extLst>
@@ -5048,7 +5950,7 @@
 </p:sld>
 </file>
 
-<file path=ppt/slides/slide7.xml><?xml version="1.0" encoding="utf-8"?>
+<file path=ppt/slides/slide8.xml><?xml version="1.0" encoding="utf-8"?>
 <p:sld xmlns:a="http://schemas.openxmlformats.org/drawingml/2006/main" xmlns:r="http://schemas.openxmlformats.org/officeDocument/2006/relationships" xmlns:p="http://schemas.openxmlformats.org/presentationml/2006/main">
   <p:cSld>
     <p:bg>
@@ -5520,7 +6422,7 @@
 </p:sld>
 </file>
 
-<file path=ppt/slides/slide8.xml><?xml version="1.0" encoding="utf-8"?>
+<file path=ppt/slides/slide9.xml><?xml version="1.0" encoding="utf-8"?>
 <p:sld xmlns:a="http://schemas.openxmlformats.org/drawingml/2006/main" xmlns:r="http://schemas.openxmlformats.org/officeDocument/2006/relationships" xmlns:p="http://schemas.openxmlformats.org/presentationml/2006/main">
   <p:cSld>
     <p:spTree>
@@ -5684,687 +6586,6 @@
     <p:extLst>
       <p:ext uri="{BB962C8B-B14F-4D97-AF65-F5344CB8AC3E}">
         <p14:creationId xmlns:p14="http://schemas.microsoft.com/office/powerpoint/2010/main" val="215287701"/>
-      </p:ext>
-    </p:extLst>
-  </p:cSld>
-  <p:clrMapOvr>
-    <a:masterClrMapping/>
-  </p:clrMapOvr>
-</p:sld>
-</file>
-
-<file path=ppt/slides/slide9.xml><?xml version="1.0" encoding="utf-8"?>
-<p:sld xmlns:a="http://schemas.openxmlformats.org/drawingml/2006/main" xmlns:r="http://schemas.openxmlformats.org/officeDocument/2006/relationships" xmlns:p="http://schemas.openxmlformats.org/presentationml/2006/main">
-  <p:cSld>
-    <p:bg>
-      <p:bgPr>
-        <a:solidFill>
-          <a:schemeClr val="bg1"/>
-        </a:solidFill>
-        <a:effectLst/>
-      </p:bgPr>
-    </p:bg>
-    <p:spTree>
-      <p:nvGrpSpPr>
-        <p:cNvPr id="1" name=""/>
-        <p:cNvGrpSpPr/>
-        <p:nvPr/>
-      </p:nvGrpSpPr>
-      <p:grpSpPr>
-        <a:xfrm>
-          <a:off x="0" y="0"/>
-          <a:ext cx="0" cy="0"/>
-          <a:chOff x="0" y="0"/>
-          <a:chExt cx="0" cy="0"/>
-        </a:xfrm>
-      </p:grpSpPr>
-      <p:sp>
-        <p:nvSpPr>
-          <p:cNvPr id="11" name="Rectangle 10">
-            <a:extLst>
-              <a:ext uri="{FF2B5EF4-FFF2-40B4-BE49-F238E27FC236}">
-                <a16:creationId xmlns:a16="http://schemas.microsoft.com/office/drawing/2014/main" id="{38CA78E7-359D-40DC-AFAB-8287268FC695}"/>
-              </a:ext>
-              <a:ext uri="{C183D7F6-B498-43B3-948B-1728B52AA6E4}">
-                <adec:decorative xmlns:adec="http://schemas.microsoft.com/office/drawing/2017/decorative" val="1"/>
-              </a:ext>
-            </a:extLst>
-          </p:cNvPr>
-          <p:cNvSpPr>
-            <a:spLocks noGrp="1" noRot="1" noChangeAspect="1" noMove="1" noResize="1" noEditPoints="1" noAdjustHandles="1" noChangeArrowheads="1" noChangeShapeType="1" noTextEdit="1"/>
-          </p:cNvSpPr>
-          <p:nvPr>
-            <p:extLst>
-              <p:ext uri="{386F3935-93C4-4BCD-93E2-E3B085C9AB24}">
-                <p16:designElem xmlns:p16="http://schemas.microsoft.com/office/powerpoint/2015/main" val="1"/>
-              </p:ext>
-            </p:extLst>
-          </p:nvPr>
-        </p:nvSpPr>
-        <p:spPr>
-          <a:xfrm>
-            <a:off x="3175" y="6400800"/>
-            <a:ext cx="12188825" cy="457200"/>
-          </a:xfrm>
-          <a:prstGeom prst="rect">
-            <a:avLst/>
-          </a:prstGeom>
-          <a:solidFill>
-            <a:schemeClr val="accent2"/>
-          </a:solidFill>
-          <a:ln>
-            <a:noFill/>
-          </a:ln>
-        </p:spPr>
-        <p:style>
-          <a:lnRef idx="2">
-            <a:schemeClr val="accent1">
-              <a:shade val="50000"/>
-            </a:schemeClr>
-          </a:lnRef>
-          <a:fillRef idx="1">
-            <a:schemeClr val="accent1"/>
-          </a:fillRef>
-          <a:effectRef idx="0">
-            <a:schemeClr val="accent1"/>
-          </a:effectRef>
-          <a:fontRef idx="minor">
-            <a:schemeClr val="lt1"/>
-          </a:fontRef>
-        </p:style>
-      </p:sp>
-      <p:sp>
-        <p:nvSpPr>
-          <p:cNvPr id="13" name="Rectangle 12">
-            <a:extLst>
-              <a:ext uri="{FF2B5EF4-FFF2-40B4-BE49-F238E27FC236}">
-                <a16:creationId xmlns:a16="http://schemas.microsoft.com/office/drawing/2014/main" id="{8ECA9D09-8011-4ADA-AC83-425AD46E8741}"/>
-              </a:ext>
-              <a:ext uri="{C183D7F6-B498-43B3-948B-1728B52AA6E4}">
-                <adec:decorative xmlns:adec="http://schemas.microsoft.com/office/drawing/2017/decorative" val="1"/>
-              </a:ext>
-            </a:extLst>
-          </p:cNvPr>
-          <p:cNvSpPr>
-            <a:spLocks noGrp="1" noRot="1" noChangeAspect="1" noMove="1" noResize="1" noEditPoints="1" noAdjustHandles="1" noChangeArrowheads="1" noChangeShapeType="1" noTextEdit="1"/>
-          </p:cNvSpPr>
-          <p:nvPr>
-            <p:extLst>
-              <p:ext uri="{386F3935-93C4-4BCD-93E2-E3B085C9AB24}">
-                <p16:designElem xmlns:p16="http://schemas.microsoft.com/office/powerpoint/2015/main" val="1"/>
-              </p:ext>
-            </p:extLst>
-          </p:nvPr>
-        </p:nvSpPr>
-        <p:spPr>
-          <a:xfrm>
-            <a:off x="15" y="6334316"/>
-            <a:ext cx="12188825" cy="64008"/>
-          </a:xfrm>
-          <a:prstGeom prst="rect">
-            <a:avLst/>
-          </a:prstGeom>
-          <a:solidFill>
-            <a:schemeClr val="accent1"/>
-          </a:solidFill>
-          <a:ln>
-            <a:noFill/>
-          </a:ln>
-        </p:spPr>
-        <p:style>
-          <a:lnRef idx="2">
-            <a:schemeClr val="accent1">
-              <a:shade val="50000"/>
-            </a:schemeClr>
-          </a:lnRef>
-          <a:fillRef idx="1">
-            <a:schemeClr val="accent1"/>
-          </a:fillRef>
-          <a:effectRef idx="0">
-            <a:schemeClr val="accent1"/>
-          </a:effectRef>
-          <a:fontRef idx="minor">
-            <a:schemeClr val="lt1"/>
-          </a:fontRef>
-        </p:style>
-      </p:sp>
-      <p:cxnSp>
-        <p:nvCxnSpPr>
-          <p:cNvPr id="15" name="Straight Connector 14">
-            <a:extLst>
-              <a:ext uri="{FF2B5EF4-FFF2-40B4-BE49-F238E27FC236}">
-                <a16:creationId xmlns:a16="http://schemas.microsoft.com/office/drawing/2014/main" id="{12A25E9B-15F8-4123-8275-812AD89E2F3F}"/>
-              </a:ext>
-              <a:ext uri="{C183D7F6-B498-43B3-948B-1728B52AA6E4}">
-                <adec:decorative xmlns:adec="http://schemas.microsoft.com/office/drawing/2017/decorative" val="1"/>
-              </a:ext>
-            </a:extLst>
-          </p:cNvPr>
-          <p:cNvCxnSpPr>
-            <a:cxnSpLocks noGrp="1" noRot="1" noChangeAspect="1" noMove="1" noResize="1" noEditPoints="1" noAdjustHandles="1" noChangeArrowheads="1" noChangeShapeType="1"/>
-          </p:cNvCxnSpPr>
-          <p:nvPr>
-            <p:extLst>
-              <p:ext uri="{386F3935-93C4-4BCD-93E2-E3B085C9AB24}">
-                <p16:designElem xmlns:p16="http://schemas.microsoft.com/office/powerpoint/2015/main" val="1"/>
-              </p:ext>
-            </p:extLst>
-          </p:nvPr>
-        </p:nvCxnSpPr>
-        <p:spPr>
-          <a:xfrm>
-            <a:off x="1207658" y="4343400"/>
-            <a:ext cx="9875520" cy="0"/>
-          </a:xfrm>
-          <a:prstGeom prst="line">
-            <a:avLst/>
-          </a:prstGeom>
-          <a:ln w="6350">
-            <a:solidFill>
-              <a:schemeClr val="tx1">
-                <a:lumMod val="50000"/>
-                <a:lumOff val="50000"/>
-              </a:schemeClr>
-            </a:solidFill>
-          </a:ln>
-        </p:spPr>
-        <p:style>
-          <a:lnRef idx="1">
-            <a:schemeClr val="accent1"/>
-          </a:lnRef>
-          <a:fillRef idx="0">
-            <a:schemeClr val="accent1"/>
-          </a:fillRef>
-          <a:effectRef idx="0">
-            <a:schemeClr val="accent1"/>
-          </a:effectRef>
-          <a:fontRef idx="minor">
-            <a:schemeClr val="tx1"/>
-          </a:fontRef>
-        </p:style>
-      </p:cxnSp>
-      <p:sp useBgFill="1">
-        <p:nvSpPr>
-          <p:cNvPr id="17" name="Rectangle 16">
-            <a:extLst>
-              <a:ext uri="{FF2B5EF4-FFF2-40B4-BE49-F238E27FC236}">
-                <a16:creationId xmlns:a16="http://schemas.microsoft.com/office/drawing/2014/main" id="{1F9037C3-85A3-4BCB-88A2-ADB8F64D2514}"/>
-              </a:ext>
-              <a:ext uri="{C183D7F6-B498-43B3-948B-1728B52AA6E4}">
-                <adec:decorative xmlns:adec="http://schemas.microsoft.com/office/drawing/2017/decorative" val="1"/>
-              </a:ext>
-            </a:extLst>
-          </p:cNvPr>
-          <p:cNvSpPr>
-            <a:spLocks noGrp="1" noRot="1" noChangeAspect="1" noMove="1" noResize="1" noEditPoints="1" noAdjustHandles="1" noChangeArrowheads="1" noChangeShapeType="1" noTextEdit="1"/>
-          </p:cNvSpPr>
-          <p:nvPr>
-            <p:extLst>
-              <p:ext uri="{386F3935-93C4-4BCD-93E2-E3B085C9AB24}">
-                <p16:designElem xmlns:p16="http://schemas.microsoft.com/office/powerpoint/2015/main" val="1"/>
-              </p:ext>
-            </p:extLst>
-          </p:nvPr>
-        </p:nvSpPr>
-        <p:spPr>
-          <a:xfrm>
-            <a:off x="0" y="0"/>
-            <a:ext cx="12192001" cy="6334316"/>
-          </a:xfrm>
-          <a:prstGeom prst="rect">
-            <a:avLst/>
-          </a:prstGeom>
-          <a:ln>
-            <a:noFill/>
-          </a:ln>
-        </p:spPr>
-        <p:style>
-          <a:lnRef idx="2">
-            <a:schemeClr val="accent1">
-              <a:shade val="50000"/>
-            </a:schemeClr>
-          </a:lnRef>
-          <a:fillRef idx="1">
-            <a:schemeClr val="accent1"/>
-          </a:fillRef>
-          <a:effectRef idx="0">
-            <a:schemeClr val="accent1"/>
-          </a:effectRef>
-          <a:fontRef idx="minor">
-            <a:schemeClr val="lt1"/>
-          </a:fontRef>
-        </p:style>
-        <p:txBody>
-          <a:bodyPr rtlCol="0" anchor="ctr"/>
-          <a:lstStyle/>
-          <a:p>
-            <a:pPr algn="ctr"/>
-            <a:endParaRPr lang="en-US"/>
-          </a:p>
-        </p:txBody>
-      </p:sp>
-      <p:sp>
-        <p:nvSpPr>
-          <p:cNvPr id="2" name="Title 1">
-            <a:extLst>
-              <a:ext uri="{FF2B5EF4-FFF2-40B4-BE49-F238E27FC236}">
-                <a16:creationId xmlns:a16="http://schemas.microsoft.com/office/drawing/2014/main" id="{59587CA1-46A1-4F59-B364-C459CE03A71A}"/>
-              </a:ext>
-            </a:extLst>
-          </p:cNvPr>
-          <p:cNvSpPr>
-            <a:spLocks noGrp="1"/>
-          </p:cNvSpPr>
-          <p:nvPr>
-            <p:ph type="title"/>
-          </p:nvPr>
-        </p:nvSpPr>
-        <p:spPr>
-          <a:xfrm>
-            <a:off x="633999" y="4550229"/>
-            <a:ext cx="10909073" cy="1057655"/>
-          </a:xfrm>
-        </p:spPr>
-        <p:txBody>
-          <a:bodyPr vert="horz" lIns="91440" tIns="45720" rIns="91440" bIns="45720" rtlCol="0" anchor="b">
-            <a:normAutofit/>
-          </a:bodyPr>
-          <a:lstStyle/>
-          <a:p>
-            <a:r>
-              <a:rPr lang="en-US" sz="6000">
-                <a:solidFill>
-                  <a:schemeClr val="tx1">
-                    <a:lumMod val="85000"/>
-                    <a:lumOff val="15000"/>
-                  </a:schemeClr>
-                </a:solidFill>
-              </a:rPr>
-              <a:t>Challenges</a:t>
-            </a:r>
-          </a:p>
-        </p:txBody>
-      </p:sp>
-      <p:pic>
-        <p:nvPicPr>
-          <p:cNvPr id="5" name="Content Placeholder 4" descr="Chart&#10;&#10;Description automatically generated">
-            <a:extLst>
-              <a:ext uri="{FF2B5EF4-FFF2-40B4-BE49-F238E27FC236}">
-                <a16:creationId xmlns:a16="http://schemas.microsoft.com/office/drawing/2014/main" id="{5201FC71-05B9-4AFD-8E57-6E9CC5FF7F62}"/>
-              </a:ext>
-            </a:extLst>
-          </p:cNvPr>
-          <p:cNvPicPr>
-            <a:picLocks noGrp="1" noChangeAspect="1"/>
-          </p:cNvPicPr>
-          <p:nvPr>
-            <p:ph idx="1"/>
-          </p:nvPr>
-        </p:nvPicPr>
-        <p:blipFill>
-          <a:blip r:embed="rId2"/>
-          <a:stretch>
-            <a:fillRect/>
-          </a:stretch>
-        </p:blipFill>
-        <p:spPr>
-          <a:xfrm>
-            <a:off x="26702" y="1308409"/>
-            <a:ext cx="4157503" cy="2203476"/>
-          </a:xfrm>
-          <a:prstGeom prst="rect">
-            <a:avLst/>
-          </a:prstGeom>
-        </p:spPr>
-      </p:pic>
-      <p:sp>
-        <p:nvSpPr>
-          <p:cNvPr id="19" name="Rectangle 18">
-            <a:extLst>
-              <a:ext uri="{FF2B5EF4-FFF2-40B4-BE49-F238E27FC236}">
-                <a16:creationId xmlns:a16="http://schemas.microsoft.com/office/drawing/2014/main" id="{B69980A3-C206-42F5-BF92-5E9FB6E9676D}"/>
-              </a:ext>
-              <a:ext uri="{C183D7F6-B498-43B3-948B-1728B52AA6E4}">
-                <adec:decorative xmlns:adec="http://schemas.microsoft.com/office/drawing/2017/decorative" val="1"/>
-              </a:ext>
-            </a:extLst>
-          </p:cNvPr>
-          <p:cNvSpPr>
-            <a:spLocks noGrp="1" noRot="1" noChangeAspect="1" noMove="1" noResize="1" noEditPoints="1" noAdjustHandles="1" noChangeArrowheads="1" noChangeShapeType="1" noTextEdit="1"/>
-          </p:cNvSpPr>
-          <p:nvPr>
-            <p:extLst>
-              <p:ext uri="{386F3935-93C4-4BCD-93E2-E3B085C9AB24}">
-                <p16:designElem xmlns:p16="http://schemas.microsoft.com/office/powerpoint/2015/main" val="1"/>
-              </p:ext>
-            </p:extLst>
-          </p:nvPr>
-        </p:nvSpPr>
-        <p:spPr>
-          <a:xfrm>
-            <a:off x="4158553" y="886968"/>
-            <a:ext cx="64008" cy="3108960"/>
-          </a:xfrm>
-          <a:prstGeom prst="rect">
-            <a:avLst/>
-          </a:prstGeom>
-          <a:ln>
-            <a:noFill/>
-          </a:ln>
-        </p:spPr>
-        <p:style>
-          <a:lnRef idx="2">
-            <a:schemeClr val="accent1">
-              <a:shade val="50000"/>
-            </a:schemeClr>
-          </a:lnRef>
-          <a:fillRef idx="1">
-            <a:schemeClr val="accent1"/>
-          </a:fillRef>
-          <a:effectRef idx="0">
-            <a:schemeClr val="accent1"/>
-          </a:effectRef>
-          <a:fontRef idx="minor">
-            <a:schemeClr val="lt1"/>
-          </a:fontRef>
-        </p:style>
-        <p:txBody>
-          <a:bodyPr rtlCol="0" anchor="ctr"/>
-          <a:lstStyle/>
-          <a:p>
-            <a:pPr algn="ctr"/>
-            <a:endParaRPr lang="en-US"/>
-          </a:p>
-        </p:txBody>
-      </p:sp>
-      <p:pic>
-        <p:nvPicPr>
-          <p:cNvPr id="4" name="Picture 3" descr="Chart, bar chart&#10;&#10;Description automatically generated">
-            <a:extLst>
-              <a:ext uri="{FF2B5EF4-FFF2-40B4-BE49-F238E27FC236}">
-                <a16:creationId xmlns:a16="http://schemas.microsoft.com/office/drawing/2014/main" id="{C99C1740-8448-4621-A39D-1F23325BF5F9}"/>
-              </a:ext>
-            </a:extLst>
-          </p:cNvPr>
-          <p:cNvPicPr>
-            <a:picLocks noChangeAspect="1"/>
-          </p:cNvPicPr>
-          <p:nvPr/>
-        </p:nvPicPr>
-        <p:blipFill>
-          <a:blip r:embed="rId3"/>
-          <a:stretch>
-            <a:fillRect/>
-          </a:stretch>
-        </p:blipFill>
-        <p:spPr>
-          <a:xfrm>
-            <a:off x="4235181" y="1446429"/>
-            <a:ext cx="3706707" cy="1899687"/>
-          </a:xfrm>
-          <a:prstGeom prst="rect">
-            <a:avLst/>
-          </a:prstGeom>
-        </p:spPr>
-      </p:pic>
-      <p:sp>
-        <p:nvSpPr>
-          <p:cNvPr id="21" name="Rectangle 20">
-            <a:extLst>
-              <a:ext uri="{FF2B5EF4-FFF2-40B4-BE49-F238E27FC236}">
-                <a16:creationId xmlns:a16="http://schemas.microsoft.com/office/drawing/2014/main" id="{0B1AC6D6-1B75-4EA6-B60E-DBD2E3F4F807}"/>
-              </a:ext>
-              <a:ext uri="{C183D7F6-B498-43B3-948B-1728B52AA6E4}">
-                <adec:decorative xmlns:adec="http://schemas.microsoft.com/office/drawing/2017/decorative" val="1"/>
-              </a:ext>
-            </a:extLst>
-          </p:cNvPr>
-          <p:cNvSpPr>
-            <a:spLocks noGrp="1" noRot="1" noChangeAspect="1" noMove="1" noResize="1" noEditPoints="1" noAdjustHandles="1" noChangeArrowheads="1" noChangeShapeType="1" noTextEdit="1"/>
-          </p:cNvSpPr>
-          <p:nvPr>
-            <p:extLst>
-              <p:ext uri="{386F3935-93C4-4BCD-93E2-E3B085C9AB24}">
-                <p16:designElem xmlns:p16="http://schemas.microsoft.com/office/powerpoint/2015/main" val="1"/>
-              </p:ext>
-            </p:extLst>
-          </p:nvPr>
-        </p:nvSpPr>
-        <p:spPr>
-          <a:xfrm>
-            <a:off x="7955969" y="886968"/>
-            <a:ext cx="64008" cy="3108960"/>
-          </a:xfrm>
-          <a:prstGeom prst="rect">
-            <a:avLst/>
-          </a:prstGeom>
-          <a:ln>
-            <a:noFill/>
-          </a:ln>
-        </p:spPr>
-        <p:style>
-          <a:lnRef idx="2">
-            <a:schemeClr val="accent1">
-              <a:shade val="50000"/>
-            </a:schemeClr>
-          </a:lnRef>
-          <a:fillRef idx="1">
-            <a:schemeClr val="accent1"/>
-          </a:fillRef>
-          <a:effectRef idx="0">
-            <a:schemeClr val="accent1"/>
-          </a:effectRef>
-          <a:fontRef idx="minor">
-            <a:schemeClr val="lt1"/>
-          </a:fontRef>
-        </p:style>
-        <p:txBody>
-          <a:bodyPr rtlCol="0" anchor="ctr"/>
-          <a:lstStyle/>
-          <a:p>
-            <a:pPr algn="ctr"/>
-            <a:endParaRPr lang="en-US"/>
-          </a:p>
-        </p:txBody>
-      </p:sp>
-      <p:pic>
-        <p:nvPicPr>
-          <p:cNvPr id="6" name="Picture 5" descr="Chart, bar chart&#10;&#10;Description automatically generated">
-            <a:extLst>
-              <a:ext uri="{FF2B5EF4-FFF2-40B4-BE49-F238E27FC236}">
-                <a16:creationId xmlns:a16="http://schemas.microsoft.com/office/drawing/2014/main" id="{B20E12BF-88A3-4CB8-AB74-C001B941E4EB}"/>
-              </a:ext>
-            </a:extLst>
-          </p:cNvPr>
-          <p:cNvPicPr>
-            <a:picLocks noChangeAspect="1"/>
-          </p:cNvPicPr>
-          <p:nvPr/>
-        </p:nvPicPr>
-        <p:blipFill>
-          <a:blip r:embed="rId4"/>
-          <a:stretch>
-            <a:fillRect/>
-          </a:stretch>
-        </p:blipFill>
-        <p:spPr>
-          <a:xfrm>
-            <a:off x="8049853" y="1308409"/>
-            <a:ext cx="4114182" cy="2159945"/>
-          </a:xfrm>
-          <a:prstGeom prst="rect">
-            <a:avLst/>
-          </a:prstGeom>
-        </p:spPr>
-      </p:pic>
-      <p:cxnSp>
-        <p:nvCxnSpPr>
-          <p:cNvPr id="23" name="Straight Connector 22">
-            <a:extLst>
-              <a:ext uri="{FF2B5EF4-FFF2-40B4-BE49-F238E27FC236}">
-                <a16:creationId xmlns:a16="http://schemas.microsoft.com/office/drawing/2014/main" id="{0A9E7251-BA01-4FA8-B283-706FBA6CE251}"/>
-              </a:ext>
-              <a:ext uri="{C183D7F6-B498-43B3-948B-1728B52AA6E4}">
-                <adec:decorative xmlns:adec="http://schemas.microsoft.com/office/drawing/2017/decorative" val="1"/>
-              </a:ext>
-            </a:extLst>
-          </p:cNvPr>
-          <p:cNvCxnSpPr>
-            <a:cxnSpLocks noGrp="1" noRot="1" noChangeAspect="1" noMove="1" noResize="1" noEditPoints="1" noAdjustHandles="1" noChangeArrowheads="1" noChangeShapeType="1"/>
-          </p:cNvCxnSpPr>
-          <p:nvPr>
-            <p:extLst>
-              <p:ext uri="{386F3935-93C4-4BCD-93E2-E3B085C9AB24}">
-                <p16:designElem xmlns:p16="http://schemas.microsoft.com/office/powerpoint/2015/main" val="1"/>
-              </p:ext>
-            </p:extLst>
-          </p:nvPr>
-        </p:nvCxnSpPr>
-        <p:spPr>
-          <a:xfrm>
-            <a:off x="721086" y="5618770"/>
-            <a:ext cx="10515600" cy="0"/>
-          </a:xfrm>
-          <a:prstGeom prst="line">
-            <a:avLst/>
-          </a:prstGeom>
-          <a:ln w="6350">
-            <a:solidFill>
-              <a:schemeClr val="tx2">
-                <a:alpha val="90000"/>
-              </a:schemeClr>
-            </a:solidFill>
-          </a:ln>
-        </p:spPr>
-        <p:style>
-          <a:lnRef idx="1">
-            <a:schemeClr val="accent1"/>
-          </a:lnRef>
-          <a:fillRef idx="0">
-            <a:schemeClr val="accent1"/>
-          </a:fillRef>
-          <a:effectRef idx="0">
-            <a:schemeClr val="accent1"/>
-          </a:effectRef>
-          <a:fontRef idx="minor">
-            <a:schemeClr val="tx1"/>
-          </a:fontRef>
-        </p:style>
-      </p:cxnSp>
-      <p:sp>
-        <p:nvSpPr>
-          <p:cNvPr id="25" name="Rectangle 24">
-            <a:extLst>
-              <a:ext uri="{FF2B5EF4-FFF2-40B4-BE49-F238E27FC236}">
-                <a16:creationId xmlns:a16="http://schemas.microsoft.com/office/drawing/2014/main" id="{8224CB75-6074-47E8-ABC3-6651B39FCB75}"/>
-              </a:ext>
-              <a:ext uri="{C183D7F6-B498-43B3-948B-1728B52AA6E4}">
-                <adec:decorative xmlns:adec="http://schemas.microsoft.com/office/drawing/2017/decorative" val="1"/>
-              </a:ext>
-            </a:extLst>
-          </p:cNvPr>
-          <p:cNvSpPr>
-            <a:spLocks noGrp="1" noRot="1" noChangeAspect="1" noMove="1" noResize="1" noEditPoints="1" noAdjustHandles="1" noChangeArrowheads="1" noChangeShapeType="1" noTextEdit="1"/>
-          </p:cNvSpPr>
-          <p:nvPr>
-            <p:extLst>
-              <p:ext uri="{386F3935-93C4-4BCD-93E2-E3B085C9AB24}">
-                <p16:designElem xmlns:p16="http://schemas.microsoft.com/office/powerpoint/2015/main" val="1"/>
-              </p:ext>
-            </p:extLst>
-          </p:nvPr>
-        </p:nvSpPr>
-        <p:spPr>
-          <a:xfrm>
-            <a:off x="15" y="6334316"/>
-            <a:ext cx="12191985" cy="66484"/>
-          </a:xfrm>
-          <a:prstGeom prst="rect">
-            <a:avLst/>
-          </a:prstGeom>
-          <a:solidFill>
-            <a:schemeClr val="accent1"/>
-          </a:solidFill>
-          <a:ln>
-            <a:noFill/>
-          </a:ln>
-        </p:spPr>
-        <p:style>
-          <a:lnRef idx="2">
-            <a:schemeClr val="accent1">
-              <a:shade val="50000"/>
-            </a:schemeClr>
-          </a:lnRef>
-          <a:fillRef idx="1">
-            <a:schemeClr val="accent1"/>
-          </a:fillRef>
-          <a:effectRef idx="0">
-            <a:schemeClr val="accent1"/>
-          </a:effectRef>
-          <a:fontRef idx="minor">
-            <a:schemeClr val="lt1"/>
-          </a:fontRef>
-        </p:style>
-      </p:sp>
-      <p:sp>
-        <p:nvSpPr>
-          <p:cNvPr id="27" name="Rectangle 26">
-            <a:extLst>
-              <a:ext uri="{FF2B5EF4-FFF2-40B4-BE49-F238E27FC236}">
-                <a16:creationId xmlns:a16="http://schemas.microsoft.com/office/drawing/2014/main" id="{317E8644-19CA-4B48-8CF2-BE1FF1444C63}"/>
-              </a:ext>
-              <a:ext uri="{C183D7F6-B498-43B3-948B-1728B52AA6E4}">
-                <adec:decorative xmlns:adec="http://schemas.microsoft.com/office/drawing/2017/decorative" val="1"/>
-              </a:ext>
-            </a:extLst>
-          </p:cNvPr>
-          <p:cNvSpPr>
-            <a:spLocks noGrp="1" noRot="1" noChangeAspect="1" noMove="1" noResize="1" noEditPoints="1" noAdjustHandles="1" noChangeArrowheads="1" noChangeShapeType="1" noTextEdit="1"/>
-          </p:cNvSpPr>
-          <p:nvPr>
-            <p:extLst>
-              <p:ext uri="{386F3935-93C4-4BCD-93E2-E3B085C9AB24}">
-                <p16:designElem xmlns:p16="http://schemas.microsoft.com/office/powerpoint/2015/main" val="1"/>
-              </p:ext>
-            </p:extLst>
-          </p:nvPr>
-        </p:nvSpPr>
-        <p:spPr>
-          <a:xfrm>
-            <a:off x="1" y="6400800"/>
-            <a:ext cx="12192000" cy="457200"/>
-          </a:xfrm>
-          <a:prstGeom prst="rect">
-            <a:avLst/>
-          </a:prstGeom>
-          <a:solidFill>
-            <a:schemeClr val="accent2"/>
-          </a:solidFill>
-          <a:ln>
-            <a:noFill/>
-          </a:ln>
-        </p:spPr>
-        <p:style>
-          <a:lnRef idx="2">
-            <a:schemeClr val="accent1">
-              <a:shade val="50000"/>
-            </a:schemeClr>
-          </a:lnRef>
-          <a:fillRef idx="1">
-            <a:schemeClr val="accent1"/>
-          </a:fillRef>
-          <a:effectRef idx="0">
-            <a:schemeClr val="accent1"/>
-          </a:effectRef>
-          <a:fontRef idx="minor">
-            <a:schemeClr val="lt1"/>
-          </a:fontRef>
-        </p:style>
-      </p:sp>
-    </p:spTree>
-    <p:extLst>
-      <p:ext uri="{BB962C8B-B14F-4D97-AF65-F5344CB8AC3E}">
-        <p14:creationId xmlns:p14="http://schemas.microsoft.com/office/powerpoint/2010/main" val="1760442444"/>
       </p:ext>
     </p:extLst>
   </p:cSld>

</xml_diff>

<commit_message>
adding county level justification
</commit_message>
<xml_diff>
--- a/PRESENTATION.pptx
+++ b/PRESENTATION.pptx
@@ -4760,13 +4760,8 @@
             </a:pPr>
             <a:r>
               <a:rPr lang="en-US" dirty="0"/>
-              <a:t>Policing &amp; enforcement varies widely within counties (ex. Cook County) and may have a partial deterrent or encouraging effect </a:t>
-            </a:r>
-            <a:r>
-              <a:rPr lang="en-US"/>
-              <a:t>on neighborhoods</a:t>
-            </a:r>
-            <a:endParaRPr lang="en-US" dirty="0"/>
+              <a:t>Policing &amp; enforcement varies widely within counties (ex. Cook County) and may have a partial deterrent or encouraging effect on neighborhoods</a:t>
+            </a:r>
           </a:p>
         </p:txBody>
       </p:sp>
@@ -5488,7 +5483,7 @@
         <p:spPr/>
         <p:txBody>
           <a:bodyPr>
-            <a:normAutofit lnSpcReduction="10000"/>
+            <a:normAutofit fontScale="92500" lnSpcReduction="20000"/>
           </a:bodyPr>
           <a:lstStyle/>
           <a:p>
@@ -5500,6 +5495,21 @@
               <a:rPr lang="en-US" dirty="0"/>
               <a:t> Panel data collected at the county level, giving more observations to conduct the analysis.</a:t>
             </a:r>
+          </a:p>
+          <a:p>
+            <a:pPr lvl="1">
+              <a:buFont typeface="Arial" panose="020B0604020202020204" pitchFamily="34" charset="0"/>
+              <a:buChar char="•"/>
+            </a:pPr>
+            <a:r>
+              <a:rPr lang="en-US" sz="1700" dirty="0"/>
+              <a:t>Previous state-level analysis have focused on statewide policy changes – but most prosecution and executions are carried out on the county-level. Sheriffs offices (who bring charges against suspects), and county prosecutors are elected and appointed county wide, and enforcement and interpretation of capital </a:t>
+            </a:r>
+            <a:r>
+              <a:rPr lang="en-US" sz="1700"/>
+              <a:t>punishment varies.</a:t>
+            </a:r>
+            <a:endParaRPr lang="en-US" sz="1700" dirty="0"/>
           </a:p>
           <a:p>
             <a:pPr>
@@ -5700,7 +5710,9 @@
         </p:nvSpPr>
         <p:spPr/>
         <p:txBody>
-          <a:bodyPr/>
+          <a:bodyPr>
+            <a:normAutofit/>
+          </a:bodyPr>
           <a:lstStyle/>
           <a:p>
             <a:pPr>
@@ -5751,6 +5763,16 @@
             </a:r>
           </a:p>
           <a:p>
+            <a:pPr lvl="1">
+              <a:buFont typeface="Arial" panose="020B0604020202020204" pitchFamily="34" charset="0"/>
+              <a:buChar char="•"/>
+            </a:pPr>
+            <a:r>
+              <a:rPr lang="en-US" dirty="0"/>
+              <a:t>Control for country wide changes over time (overall trends)</a:t>
+            </a:r>
+          </a:p>
+          <a:p>
             <a:pPr>
               <a:buFont typeface="Arial" panose="020B0604020202020204" pitchFamily="34" charset="0"/>
               <a:buChar char="•"/>
@@ -5759,6 +5781,7 @@
               <a:rPr lang="en-US" dirty="0"/>
               <a:t> FE estimation to rid unobserved variables that do not change over time – assist with omitted variable bias.</a:t>
             </a:r>
+            <a:endParaRPr lang="en-US" sz="2400" dirty="0"/>
           </a:p>
           <a:p>
             <a:pPr>

</xml_diff>